<commit_message>
pricing in proposal and presentation is added
</commit_message>
<xml_diff>
--- a/Maid In Proposal Defence Document.pptx
+++ b/Maid In Proposal Defence Document.pptx
@@ -232,7 +232,7 @@
           <a:p>
             <a:fld id="{5EE16272-617E-4DAF-98A7-1E249FC6E62B}" type="datetimeFigureOut">
               <a:rPr lang="en-US" smtClean="0"/>
-              <a:t>11/13/2022</a:t>
+              <a:t>11/14/2022</a:t>
             </a:fld>
             <a:endParaRPr lang="en-US"/>
           </a:p>
@@ -8342,35 +8342,35 @@
                 <a:gridCol w="1630680">
                   <a:extLst>
                     <a:ext uri="{9D8B030D-6E8A-4147-A177-3AD203B41FA5}">
-                      <a16:colId xmlns:a16="http://schemas.microsoft.com/office/drawing/2014/main" val="2817198724"/>
+                      <a16:colId xmlns:a16="http://schemas.microsoft.com/office/drawing/2014/main" xmlns="" val="2817198724"/>
                     </a:ext>
                   </a:extLst>
                 </a:gridCol>
                 <a:gridCol w="1630680">
                   <a:extLst>
                     <a:ext uri="{9D8B030D-6E8A-4147-A177-3AD203B41FA5}">
-                      <a16:colId xmlns:a16="http://schemas.microsoft.com/office/drawing/2014/main" val="3954306868"/>
+                      <a16:colId xmlns:a16="http://schemas.microsoft.com/office/drawing/2014/main" xmlns="" val="3954306868"/>
                     </a:ext>
                   </a:extLst>
                 </a:gridCol>
                 <a:gridCol w="1630680">
                   <a:extLst>
                     <a:ext uri="{9D8B030D-6E8A-4147-A177-3AD203B41FA5}">
-                      <a16:colId xmlns:a16="http://schemas.microsoft.com/office/drawing/2014/main" val="3592228136"/>
+                      <a16:colId xmlns:a16="http://schemas.microsoft.com/office/drawing/2014/main" xmlns="" val="3592228136"/>
                     </a:ext>
                   </a:extLst>
                 </a:gridCol>
                 <a:gridCol w="1630680">
                   <a:extLst>
                     <a:ext uri="{9D8B030D-6E8A-4147-A177-3AD203B41FA5}">
-                      <a16:colId xmlns:a16="http://schemas.microsoft.com/office/drawing/2014/main" val="3138199372"/>
+                      <a16:colId xmlns:a16="http://schemas.microsoft.com/office/drawing/2014/main" xmlns="" val="3138199372"/>
                     </a:ext>
                   </a:extLst>
                 </a:gridCol>
                 <a:gridCol w="1630680">
                   <a:extLst>
                     <a:ext uri="{9D8B030D-6E8A-4147-A177-3AD203B41FA5}">
-                      <a16:colId xmlns:a16="http://schemas.microsoft.com/office/drawing/2014/main" val="611672242"/>
+                      <a16:colId xmlns:a16="http://schemas.microsoft.com/office/drawing/2014/main" xmlns="" val="611672242"/>
                     </a:ext>
                   </a:extLst>
                 </a:gridCol>
@@ -8533,7 +8533,7 @@
                 </a:tc>
                 <a:extLst>
                   <a:ext uri="{0D108BD9-81ED-4DB2-BD59-A6C34878D82A}">
-                    <a16:rowId xmlns:a16="http://schemas.microsoft.com/office/drawing/2014/main" val="1421857550"/>
+                    <a16:rowId xmlns:a16="http://schemas.microsoft.com/office/drawing/2014/main" xmlns="" val="1421857550"/>
                   </a:ext>
                 </a:extLst>
               </a:tr>
@@ -8630,7 +8630,7 @@
                 </a:tc>
                 <a:extLst>
                   <a:ext uri="{0D108BD9-81ED-4DB2-BD59-A6C34878D82A}">
-                    <a16:rowId xmlns:a16="http://schemas.microsoft.com/office/drawing/2014/main" val="189024563"/>
+                    <a16:rowId xmlns:a16="http://schemas.microsoft.com/office/drawing/2014/main" xmlns="" val="189024563"/>
                   </a:ext>
                 </a:extLst>
               </a:tr>
@@ -8687,7 +8687,7 @@
                 </a:tc>
                 <a:extLst>
                   <a:ext uri="{0D108BD9-81ED-4DB2-BD59-A6C34878D82A}">
-                    <a16:rowId xmlns:a16="http://schemas.microsoft.com/office/drawing/2014/main" val="3736943799"/>
+                    <a16:rowId xmlns:a16="http://schemas.microsoft.com/office/drawing/2014/main" xmlns="" val="3736943799"/>
                   </a:ext>
                 </a:extLst>
               </a:tr>
@@ -9472,21 +9472,21 @@
                 <a:gridCol w="2006600">
                   <a:extLst>
                     <a:ext uri="{9D8B030D-6E8A-4147-A177-3AD203B41FA5}">
-                      <a16:colId xmlns:a16="http://schemas.microsoft.com/office/drawing/2014/main" val="20000"/>
+                      <a16:colId xmlns:a16="http://schemas.microsoft.com/office/drawing/2014/main" xmlns="" val="20000"/>
                     </a:ext>
                   </a:extLst>
                 </a:gridCol>
                 <a:gridCol w="2006600">
                   <a:extLst>
                     <a:ext uri="{9D8B030D-6E8A-4147-A177-3AD203B41FA5}">
-                      <a16:colId xmlns:a16="http://schemas.microsoft.com/office/drawing/2014/main" val="20001"/>
+                      <a16:colId xmlns:a16="http://schemas.microsoft.com/office/drawing/2014/main" xmlns="" val="20001"/>
                     </a:ext>
                   </a:extLst>
                 </a:gridCol>
                 <a:gridCol w="2006600">
                   <a:extLst>
                     <a:ext uri="{9D8B030D-6E8A-4147-A177-3AD203B41FA5}">
-                      <a16:colId xmlns:a16="http://schemas.microsoft.com/office/drawing/2014/main" val="20002"/>
+                      <a16:colId xmlns:a16="http://schemas.microsoft.com/office/drawing/2014/main" xmlns="" val="20002"/>
                     </a:ext>
                   </a:extLst>
                 </a:gridCol>
@@ -9536,7 +9536,7 @@
                 </a:tc>
                 <a:extLst>
                   <a:ext uri="{0D108BD9-81ED-4DB2-BD59-A6C34878D82A}">
-                    <a16:rowId xmlns:a16="http://schemas.microsoft.com/office/drawing/2014/main" val="10000"/>
+                    <a16:rowId xmlns:a16="http://schemas.microsoft.com/office/drawing/2014/main" xmlns="" val="10000"/>
                   </a:ext>
                 </a:extLst>
               </a:tr>
@@ -9694,7 +9694,7 @@
                 </a:tc>
                 <a:extLst>
                   <a:ext uri="{0D108BD9-81ED-4DB2-BD59-A6C34878D82A}">
-                    <a16:rowId xmlns:a16="http://schemas.microsoft.com/office/drawing/2014/main" val="10001"/>
+                    <a16:rowId xmlns:a16="http://schemas.microsoft.com/office/drawing/2014/main" xmlns="" val="10001"/>
                   </a:ext>
                 </a:extLst>
               </a:tr>
@@ -9855,7 +9855,7 @@
                 </a:tc>
                 <a:extLst>
                   <a:ext uri="{0D108BD9-81ED-4DB2-BD59-A6C34878D82A}">
-                    <a16:rowId xmlns:a16="http://schemas.microsoft.com/office/drawing/2014/main" val="10002"/>
+                    <a16:rowId xmlns:a16="http://schemas.microsoft.com/office/drawing/2014/main" xmlns="" val="10002"/>
                   </a:ext>
                 </a:extLst>
               </a:tr>
@@ -10103,21 +10103,21 @@
                 <a:gridCol w="2032000">
                   <a:extLst>
                     <a:ext uri="{9D8B030D-6E8A-4147-A177-3AD203B41FA5}">
-                      <a16:colId xmlns:a16="http://schemas.microsoft.com/office/drawing/2014/main" val="20000"/>
+                      <a16:colId xmlns:a16="http://schemas.microsoft.com/office/drawing/2014/main" xmlns="" val="20000"/>
                     </a:ext>
                   </a:extLst>
                 </a:gridCol>
                 <a:gridCol w="2032000">
                   <a:extLst>
                     <a:ext uri="{9D8B030D-6E8A-4147-A177-3AD203B41FA5}">
-                      <a16:colId xmlns:a16="http://schemas.microsoft.com/office/drawing/2014/main" val="20001"/>
+                      <a16:colId xmlns:a16="http://schemas.microsoft.com/office/drawing/2014/main" xmlns="" val="20001"/>
                     </a:ext>
                   </a:extLst>
                 </a:gridCol>
                 <a:gridCol w="2032000">
                   <a:extLst>
                     <a:ext uri="{9D8B030D-6E8A-4147-A177-3AD203B41FA5}">
-                      <a16:colId xmlns:a16="http://schemas.microsoft.com/office/drawing/2014/main" val="20002"/>
+                      <a16:colId xmlns:a16="http://schemas.microsoft.com/office/drawing/2014/main" xmlns="" val="20002"/>
                     </a:ext>
                   </a:extLst>
                 </a:gridCol>
@@ -10167,7 +10167,7 @@
                 </a:tc>
                 <a:extLst>
                   <a:ext uri="{0D108BD9-81ED-4DB2-BD59-A6C34878D82A}">
-                    <a16:rowId xmlns:a16="http://schemas.microsoft.com/office/drawing/2014/main" val="10000"/>
+                    <a16:rowId xmlns:a16="http://schemas.microsoft.com/office/drawing/2014/main" xmlns="" val="10000"/>
                   </a:ext>
                 </a:extLst>
               </a:tr>
@@ -10328,7 +10328,7 @@
                 </a:tc>
                 <a:extLst>
                   <a:ext uri="{0D108BD9-81ED-4DB2-BD59-A6C34878D82A}">
-                    <a16:rowId xmlns:a16="http://schemas.microsoft.com/office/drawing/2014/main" val="10001"/>
+                    <a16:rowId xmlns:a16="http://schemas.microsoft.com/office/drawing/2014/main" xmlns="" val="10001"/>
                   </a:ext>
                 </a:extLst>
               </a:tr>
@@ -11107,7 +11107,7 @@
           <p:nvPr>
             <p:extLst>
               <p:ext uri="{D42A27DB-BD31-4B8C-83A1-F6EECF244321}">
-                <p14:modId xmlns:p14="http://schemas.microsoft.com/office/powerpoint/2010/main" val="3841690680"/>
+                <p14:modId xmlns:p14="http://schemas.microsoft.com/office/powerpoint/2010/main" val="2667185923"/>
               </p:ext>
             </p:extLst>
           </p:nvPr>
@@ -11126,21 +11126,21 @@
                 <a:gridCol w="2224405">
                   <a:extLst>
                     <a:ext uri="{9D8B030D-6E8A-4147-A177-3AD203B41FA5}">
-                      <a16:colId xmlns:a16="http://schemas.microsoft.com/office/drawing/2014/main" val="20000"/>
+                      <a16:colId xmlns:a16="http://schemas.microsoft.com/office/drawing/2014/main" xmlns="" val="20000"/>
                     </a:ext>
                   </a:extLst>
                 </a:gridCol>
                 <a:gridCol w="2224405">
                   <a:extLst>
                     <a:ext uri="{9D8B030D-6E8A-4147-A177-3AD203B41FA5}">
-                      <a16:colId xmlns:a16="http://schemas.microsoft.com/office/drawing/2014/main" val="20001"/>
+                      <a16:colId xmlns:a16="http://schemas.microsoft.com/office/drawing/2014/main" xmlns="" val="20001"/>
                     </a:ext>
                   </a:extLst>
                 </a:gridCol>
                 <a:gridCol w="2225040">
                   <a:extLst>
                     <a:ext uri="{9D8B030D-6E8A-4147-A177-3AD203B41FA5}">
-                      <a16:colId xmlns:a16="http://schemas.microsoft.com/office/drawing/2014/main" val="20002"/>
+                      <a16:colId xmlns:a16="http://schemas.microsoft.com/office/drawing/2014/main" xmlns="" val="20002"/>
                     </a:ext>
                   </a:extLst>
                 </a:gridCol>
@@ -11232,7 +11232,7 @@
                 </a:tc>
                 <a:extLst>
                   <a:ext uri="{0D108BD9-81ED-4DB2-BD59-A6C34878D82A}">
-                    <a16:rowId xmlns:a16="http://schemas.microsoft.com/office/drawing/2014/main" val="10000"/>
+                    <a16:rowId xmlns:a16="http://schemas.microsoft.com/office/drawing/2014/main" xmlns="" val="10000"/>
                   </a:ext>
                 </a:extLst>
               </a:tr>
@@ -11279,12 +11279,24 @@
                         </a:spcAft>
                       </a:pPr>
                       <a:r>
-                        <a:rPr lang="en-US" sz="1200">
+                        <a:rPr lang="en-US" sz="1200" dirty="0">
                           <a:effectLst/>
                         </a:rPr>
-                        <a:t> 500 Hours </a:t>
+                        <a:t> </a:t>
                       </a:r>
-                      <a:endParaRPr lang="en-US" sz="1200">
+                      <a:r>
+                        <a:rPr lang="en-US" sz="1200" dirty="0" smtClean="0">
+                          <a:effectLst/>
+                        </a:rPr>
+                        <a:t>100 </a:t>
+                      </a:r>
+                      <a:r>
+                        <a:rPr lang="en-US" sz="1200" dirty="0">
+                          <a:effectLst/>
+                        </a:rPr>
+                        <a:t>Hours </a:t>
+                      </a:r>
+                      <a:endParaRPr lang="en-US" sz="1200" dirty="0">
                         <a:effectLst/>
                         <a:latin typeface="Times New Roman" panose="02020603050405020304" pitchFamily="18" charset="0"/>
                         <a:ea typeface="Times New Roman" panose="02020603050405020304" pitchFamily="18" charset="0"/>
@@ -11322,7 +11334,7 @@
                         <a:rPr lang="en-US" sz="1200" dirty="0" smtClean="0">
                           <a:effectLst/>
                         </a:rPr>
-                        <a:t>100</a:t>
+                        <a:t>100,000</a:t>
                       </a:r>
                       <a:endParaRPr lang="en-US" sz="1200" dirty="0">
                         <a:effectLst/>
@@ -11335,7 +11347,7 @@
                 </a:tc>
                 <a:extLst>
                   <a:ext uri="{0D108BD9-81ED-4DB2-BD59-A6C34878D82A}">
-                    <a16:rowId xmlns:a16="http://schemas.microsoft.com/office/drawing/2014/main" val="10001"/>
+                    <a16:rowId xmlns:a16="http://schemas.microsoft.com/office/drawing/2014/main" xmlns="" val="10001"/>
                   </a:ext>
                 </a:extLst>
               </a:tr>
@@ -11382,12 +11394,18 @@
                         </a:spcAft>
                       </a:pPr>
                       <a:r>
-                        <a:rPr lang="en-US" sz="1200">
+                        <a:rPr lang="en-US" sz="1200" dirty="0">
                           <a:effectLst/>
                         </a:rPr>
-                        <a:t> 400 Hours </a:t>
+                        <a:t> </a:t>
                       </a:r>
-                      <a:endParaRPr lang="en-US" sz="1200">
+                      <a:r>
+                        <a:rPr lang="en-US" sz="1200" dirty="0" smtClean="0">
+                          <a:effectLst/>
+                        </a:rPr>
+                        <a:t>50 Hours </a:t>
+                      </a:r>
+                      <a:endParaRPr lang="en-US" sz="1200" dirty="0">
                         <a:effectLst/>
                         <a:latin typeface="Times New Roman" panose="02020603050405020304" pitchFamily="18" charset="0"/>
                         <a:ea typeface="Times New Roman" panose="02020603050405020304" pitchFamily="18" charset="0"/>
@@ -11425,7 +11443,7 @@
                         <a:rPr lang="en-US" sz="1200" dirty="0" smtClean="0">
                           <a:effectLst/>
                         </a:rPr>
-                        <a:t>100</a:t>
+                        <a:t>50,000</a:t>
                       </a:r>
                       <a:endParaRPr lang="en-US" sz="1200" dirty="0">
                         <a:effectLst/>
@@ -11438,7 +11456,7 @@
                 </a:tc>
                 <a:extLst>
                   <a:ext uri="{0D108BD9-81ED-4DB2-BD59-A6C34878D82A}">
-                    <a16:rowId xmlns:a16="http://schemas.microsoft.com/office/drawing/2014/main" val="10002"/>
+                    <a16:rowId xmlns:a16="http://schemas.microsoft.com/office/drawing/2014/main" xmlns="" val="10002"/>
                   </a:ext>
                 </a:extLst>
               </a:tr>
@@ -11485,12 +11503,24 @@
                         </a:spcAft>
                       </a:pPr>
                       <a:r>
-                        <a:rPr lang="en-US" sz="1200">
+                        <a:rPr lang="en-US" sz="1200" dirty="0">
                           <a:effectLst/>
                         </a:rPr>
-                        <a:t> 1000 Hours </a:t>
+                        <a:t> </a:t>
                       </a:r>
-                      <a:endParaRPr lang="en-US" sz="1200">
+                      <a:r>
+                        <a:rPr lang="en-US" sz="1200" dirty="0" smtClean="0">
+                          <a:effectLst/>
+                        </a:rPr>
+                        <a:t>150 </a:t>
+                      </a:r>
+                      <a:r>
+                        <a:rPr lang="en-US" sz="1200" dirty="0">
+                          <a:effectLst/>
+                        </a:rPr>
+                        <a:t>Hours </a:t>
+                      </a:r>
+                      <a:endParaRPr lang="en-US" sz="1200" dirty="0">
                         <a:effectLst/>
                         <a:latin typeface="Times New Roman" panose="02020603050405020304" pitchFamily="18" charset="0"/>
                         <a:ea typeface="Times New Roman" panose="02020603050405020304" pitchFamily="18" charset="0"/>
@@ -11519,16 +11549,16 @@
                         <a:t>Rs</a:t>
                       </a:r>
                       <a:r>
-                        <a:rPr lang="en-US" sz="1200" dirty="0">
-                          <a:effectLst/>
-                        </a:rPr>
-                        <a:t>. </a:t>
-                      </a:r>
-                      <a:r>
                         <a:rPr lang="en-US" sz="1200" dirty="0" smtClean="0">
                           <a:effectLst/>
                         </a:rPr>
-                        <a:t>100</a:t>
+                        <a:t>.</a:t>
+                      </a:r>
+                      <a:r>
+                        <a:rPr lang="en-US" sz="1200" baseline="0" dirty="0" smtClean="0">
+                          <a:effectLst/>
+                        </a:rPr>
+                        <a:t> 150,000</a:t>
                       </a:r>
                       <a:endParaRPr lang="en-US" sz="1200" dirty="0">
                         <a:effectLst/>
@@ -11541,7 +11571,7 @@
                 </a:tc>
                 <a:extLst>
                   <a:ext uri="{0D108BD9-81ED-4DB2-BD59-A6C34878D82A}">
-                    <a16:rowId xmlns:a16="http://schemas.microsoft.com/office/drawing/2014/main" val="10003"/>
+                    <a16:rowId xmlns:a16="http://schemas.microsoft.com/office/drawing/2014/main" xmlns="" val="10003"/>
                   </a:ext>
                 </a:extLst>
               </a:tr>
@@ -11588,12 +11618,24 @@
                         </a:spcAft>
                       </a:pPr>
                       <a:r>
-                        <a:rPr lang="en-US" sz="1200">
+                        <a:rPr lang="en-US" sz="1200" dirty="0">
                           <a:effectLst/>
                         </a:rPr>
-                        <a:t> 400 Hours </a:t>
+                        <a:t> </a:t>
                       </a:r>
-                      <a:endParaRPr lang="en-US" sz="1200">
+                      <a:r>
+                        <a:rPr lang="en-US" sz="1200" dirty="0" smtClean="0">
+                          <a:effectLst/>
+                        </a:rPr>
+                        <a:t>50 </a:t>
+                      </a:r>
+                      <a:r>
+                        <a:rPr lang="en-US" sz="1200" dirty="0">
+                          <a:effectLst/>
+                        </a:rPr>
+                        <a:t>Hours </a:t>
+                      </a:r>
+                      <a:endParaRPr lang="en-US" sz="1200" dirty="0">
                         <a:effectLst/>
                         <a:latin typeface="Times New Roman" panose="02020603050405020304" pitchFamily="18" charset="0"/>
                         <a:ea typeface="Times New Roman" panose="02020603050405020304" pitchFamily="18" charset="0"/>
@@ -11631,7 +11673,7 @@
                         <a:rPr lang="en-US" sz="1200" dirty="0" smtClean="0">
                           <a:effectLst/>
                         </a:rPr>
-                        <a:t>100</a:t>
+                        <a:t>50,000</a:t>
                       </a:r>
                       <a:endParaRPr lang="en-US" sz="1200" dirty="0">
                         <a:effectLst/>
@@ -11644,7 +11686,7 @@
                 </a:tc>
                 <a:extLst>
                   <a:ext uri="{0D108BD9-81ED-4DB2-BD59-A6C34878D82A}">
-                    <a16:rowId xmlns:a16="http://schemas.microsoft.com/office/drawing/2014/main" val="10004"/>
+                    <a16:rowId xmlns:a16="http://schemas.microsoft.com/office/drawing/2014/main" xmlns="" val="10004"/>
                   </a:ext>
                 </a:extLst>
               </a:tr>
@@ -11691,22 +11733,16 @@
                         </a:spcAft>
                       </a:pPr>
                       <a:r>
-                        <a:rPr lang="en-US" sz="1200" dirty="0">
-                          <a:effectLst/>
-                        </a:rPr>
-                        <a:t>2300 x </a:t>
-                      </a:r>
-                      <a:r>
                         <a:rPr lang="en-US" sz="1200" dirty="0" smtClean="0">
                           <a:effectLst/>
                         </a:rPr>
-                        <a:t>100 </a:t>
+                        <a:t>= 350,000</a:t>
                       </a:r>
                       <a:r>
                         <a:rPr lang="en-US" sz="1200" dirty="0">
                           <a:effectLst/>
                         </a:rPr>
-                        <a:t>= 230,000/- </a:t>
+                        <a:t>/- </a:t>
                       </a:r>
                       <a:endParaRPr lang="en-US" sz="1200" dirty="0">
                         <a:effectLst/>
@@ -11747,7 +11783,7 @@
                 </a:tc>
                 <a:extLst>
                   <a:ext uri="{0D108BD9-81ED-4DB2-BD59-A6C34878D82A}">
-                    <a16:rowId xmlns:a16="http://schemas.microsoft.com/office/drawing/2014/main" val="10005"/>
+                    <a16:rowId xmlns:a16="http://schemas.microsoft.com/office/drawing/2014/main" xmlns="" val="10005"/>
                   </a:ext>
                 </a:extLst>
               </a:tr>
@@ -12183,14 +12219,14 @@
           <p:nvPr>
             <p:extLst>
               <p:ext uri="{D42A27DB-BD31-4B8C-83A1-F6EECF244321}">
-                <p14:modId xmlns:p14="http://schemas.microsoft.com/office/powerpoint/2010/main" val="3143962862"/>
+                <p14:modId xmlns:p14="http://schemas.microsoft.com/office/powerpoint/2010/main" val="921634271"/>
               </p:ext>
             </p:extLst>
           </p:nvPr>
         </p:nvGraphicFramePr>
         <p:xfrm>
-          <a:off x="1066800" y="2270760"/>
-          <a:ext cx="6817360" cy="1299823"/>
+          <a:off x="1066800" y="2270757"/>
+          <a:ext cx="6817678" cy="1563556"/>
         </p:xfrm>
         <a:graphic>
           <a:graphicData uri="http://schemas.openxmlformats.org/drawingml/2006/table">
@@ -12199,22 +12235,22 @@
                 <a:tableStyleId>{5C22544A-7EE6-4342-B048-85BDC9FD1C3A}</a:tableStyleId>
               </a:tblPr>
               <a:tblGrid>
-                <a:gridCol w="3408680">
+                <a:gridCol w="3408839">
                   <a:extLst>
                     <a:ext uri="{9D8B030D-6E8A-4147-A177-3AD203B41FA5}">
-                      <a16:colId xmlns:a16="http://schemas.microsoft.com/office/drawing/2014/main" val="20000"/>
+                      <a16:colId xmlns:a16="http://schemas.microsoft.com/office/drawing/2014/main" xmlns="" val="20000"/>
                     </a:ext>
                   </a:extLst>
                 </a:gridCol>
-                <a:gridCol w="3408680">
+                <a:gridCol w="3408839">
                   <a:extLst>
                     <a:ext uri="{9D8B030D-6E8A-4147-A177-3AD203B41FA5}">
-                      <a16:colId xmlns:a16="http://schemas.microsoft.com/office/drawing/2014/main" val="20001"/>
+                      <a16:colId xmlns:a16="http://schemas.microsoft.com/office/drawing/2014/main" xmlns="" val="20001"/>
                     </a:ext>
                   </a:extLst>
                 </a:gridCol>
               </a:tblGrid>
-              <a:tr h="261538">
+              <a:tr h="335383">
                 <a:tc>
                   <a:txBody>
                     <a:bodyPr/>
@@ -12273,11 +12309,11 @@
                 </a:tc>
                 <a:extLst>
                   <a:ext uri="{0D108BD9-81ED-4DB2-BD59-A6C34878D82A}">
-                    <a16:rowId xmlns:a16="http://schemas.microsoft.com/office/drawing/2014/main" val="10000"/>
+                    <a16:rowId xmlns:a16="http://schemas.microsoft.com/office/drawing/2014/main" xmlns="" val="10000"/>
                   </a:ext>
                 </a:extLst>
               </a:tr>
-              <a:tr h="224175">
+              <a:tr h="287471">
                 <a:tc>
                   <a:txBody>
                     <a:bodyPr/>
@@ -12297,7 +12333,15 @@
                           <a:latin typeface="+mn-lt"/>
                           <a:ea typeface="+mn-ea"/>
                         </a:rPr>
-                        <a:t>.</a:t>
+                        <a:t>. MongoD</a:t>
+                      </a:r>
+                      <a:r>
+                        <a:rPr lang="en-US" sz="1200" baseline="0" dirty="0" smtClean="0">
+                          <a:effectLst/>
+                          <a:latin typeface="+mn-lt"/>
+                          <a:ea typeface="+mn-ea"/>
+                        </a:rPr>
+                        <a:t>B</a:t>
                       </a:r>
                       <a:endParaRPr lang="en-US" sz="1200" dirty="0">
                         <a:effectLst/>
@@ -12321,6 +12365,38 @@
                           <a:spcPts val="0"/>
                         </a:spcAft>
                       </a:pPr>
+                      <a:r>
+                        <a:rPr lang="en-US" sz="1200" dirty="0" smtClean="0">
+                          <a:effectLst/>
+                          <a:latin typeface="Times New Roman" panose="02020603050405020304" pitchFamily="18" charset="0"/>
+                          <a:ea typeface="Times New Roman" panose="02020603050405020304" pitchFamily="18" charset="0"/>
+                        </a:rPr>
+                        <a:t>57$</a:t>
+                      </a:r>
+                      <a:r>
+                        <a:rPr lang="en-US" sz="1200" baseline="0" dirty="0" smtClean="0">
+                          <a:effectLst/>
+                          <a:latin typeface="Times New Roman" panose="02020603050405020304" pitchFamily="18" charset="0"/>
+                          <a:ea typeface="Times New Roman" panose="02020603050405020304" pitchFamily="18" charset="0"/>
+                        </a:rPr>
+                        <a:t> = 12638 </a:t>
+                      </a:r>
+                      <a:r>
+                        <a:rPr lang="en-US" sz="1200" baseline="0" dirty="0" err="1" smtClean="0">
+                          <a:effectLst/>
+                          <a:latin typeface="Times New Roman" panose="02020603050405020304" pitchFamily="18" charset="0"/>
+                          <a:ea typeface="Times New Roman" panose="02020603050405020304" pitchFamily="18" charset="0"/>
+                        </a:rPr>
+                        <a:t>Rs</a:t>
+                      </a:r>
+                      <a:r>
+                        <a:rPr lang="en-US" sz="1200" baseline="0" dirty="0" smtClean="0">
+                          <a:effectLst/>
+                          <a:latin typeface="Times New Roman" panose="02020603050405020304" pitchFamily="18" charset="0"/>
+                          <a:ea typeface="Times New Roman" panose="02020603050405020304" pitchFamily="18" charset="0"/>
+                        </a:rPr>
+                        <a:t> / Month</a:t>
+                      </a:r>
                       <a:endParaRPr lang="en-US" sz="1200" dirty="0">
                         <a:effectLst/>
                         <a:latin typeface="Times New Roman" panose="02020603050405020304" pitchFamily="18" charset="0"/>
@@ -12332,11 +12408,11 @@
                 </a:tc>
                 <a:extLst>
                   <a:ext uri="{0D108BD9-81ED-4DB2-BD59-A6C34878D82A}">
-                    <a16:rowId xmlns:a16="http://schemas.microsoft.com/office/drawing/2014/main" val="10001"/>
+                    <a16:rowId xmlns:a16="http://schemas.microsoft.com/office/drawing/2014/main" xmlns="" val="10001"/>
                   </a:ext>
                 </a:extLst>
               </a:tr>
-              <a:tr h="224175">
+              <a:tr h="287471">
                 <a:tc>
                   <a:txBody>
                     <a:bodyPr/>
@@ -12356,7 +12432,7 @@
                           <a:latin typeface="Times New Roman" panose="02020603050405020304" pitchFamily="18" charset="0"/>
                           <a:ea typeface="Times New Roman" panose="02020603050405020304" pitchFamily="18" charset="0"/>
                         </a:rPr>
-                        <a:t>.</a:t>
+                        <a:t>. Play Store</a:t>
                       </a:r>
                       <a:endParaRPr lang="en-US" sz="1200" dirty="0">
                         <a:effectLst/>
@@ -12386,6 +12462,12 @@
                         </a:rPr>
                         <a:t> </a:t>
                       </a:r>
+                      <a:r>
+                        <a:rPr lang="en-US" sz="1200" dirty="0" smtClean="0">
+                          <a:effectLst/>
+                        </a:rPr>
+                        <a:t>100$ = 24,000Rs</a:t>
+                      </a:r>
                       <a:endParaRPr lang="en-US" sz="1200" dirty="0">
                         <a:effectLst/>
                         <a:latin typeface="Times New Roman" panose="02020603050405020304" pitchFamily="18" charset="0"/>
@@ -12397,11 +12479,11 @@
                 </a:tc>
                 <a:extLst>
                   <a:ext uri="{0D108BD9-81ED-4DB2-BD59-A6C34878D82A}">
-                    <a16:rowId xmlns:a16="http://schemas.microsoft.com/office/drawing/2014/main" val="10002"/>
+                    <a16:rowId xmlns:a16="http://schemas.microsoft.com/office/drawing/2014/main" xmlns="" val="10002"/>
                   </a:ext>
                 </a:extLst>
               </a:tr>
-              <a:tr h="224175">
+              <a:tr h="287471">
                 <a:tc>
                   <a:txBody>
                     <a:bodyPr/>
@@ -12421,7 +12503,33 @@
                           <a:latin typeface="Times New Roman" panose="02020603050405020304" pitchFamily="18" charset="0"/>
                           <a:ea typeface="Times New Roman" panose="02020603050405020304" pitchFamily="18" charset="0"/>
                         </a:rPr>
-                        <a:t>.</a:t>
+                        <a:t>. Cloud </a:t>
+                      </a:r>
+                    </a:p>
+                    <a:p>
+                      <a:pPr marL="0" marR="0">
+                        <a:spcBef>
+                          <a:spcPts val="0"/>
+                        </a:spcBef>
+                        <a:spcAft>
+                          <a:spcPts val="0"/>
+                        </a:spcAft>
+                      </a:pPr>
+                      <a:r>
+                        <a:rPr lang="en-US" sz="1200" dirty="0" smtClean="0">
+                          <a:effectLst/>
+                          <a:latin typeface="Times New Roman" panose="02020603050405020304" pitchFamily="18" charset="0"/>
+                          <a:ea typeface="Times New Roman" panose="02020603050405020304" pitchFamily="18" charset="0"/>
+                        </a:rPr>
+                        <a:t>. Third Party </a:t>
+                      </a:r>
+                      <a:r>
+                        <a:rPr lang="en-US" sz="1200" dirty="0" err="1" smtClean="0">
+                          <a:effectLst/>
+                          <a:latin typeface="Times New Roman" panose="02020603050405020304" pitchFamily="18" charset="0"/>
+                          <a:ea typeface="Times New Roman" panose="02020603050405020304" pitchFamily="18" charset="0"/>
+                        </a:rPr>
+                        <a:t>Api’s</a:t>
                       </a:r>
                       <a:endParaRPr lang="en-US" sz="1200" dirty="0">
                         <a:effectLst/>
@@ -12451,6 +12559,46 @@
                         </a:rPr>
                         <a:t> </a:t>
                       </a:r>
+                      <a:r>
+                        <a:rPr lang="en-US" sz="1200" dirty="0" smtClean="0">
+                          <a:effectLst/>
+                        </a:rPr>
+                        <a:t>300$ = 66,300Rs</a:t>
+                      </a:r>
+                    </a:p>
+                    <a:p>
+                      <a:pPr marL="0" marR="0">
+                        <a:spcBef>
+                          <a:spcPts val="0"/>
+                        </a:spcBef>
+                        <a:spcAft>
+                          <a:spcPts val="0"/>
+                        </a:spcAft>
+                      </a:pPr>
+                      <a:r>
+                        <a:rPr lang="en-US" sz="1200" dirty="0" smtClean="0">
+                          <a:effectLst/>
+                          <a:latin typeface="Times New Roman" panose="02020603050405020304" pitchFamily="18" charset="0"/>
+                          <a:ea typeface="Times New Roman" panose="02020603050405020304" pitchFamily="18" charset="0"/>
+                        </a:rPr>
+                        <a:t>300$</a:t>
+                      </a:r>
+                      <a:r>
+                        <a:rPr lang="en-US" sz="1200" baseline="0" dirty="0" smtClean="0">
+                          <a:effectLst/>
+                          <a:latin typeface="Times New Roman" panose="02020603050405020304" pitchFamily="18" charset="0"/>
+                          <a:ea typeface="Times New Roman" panose="02020603050405020304" pitchFamily="18" charset="0"/>
+                        </a:rPr>
+                        <a:t> = 66,300 </a:t>
+                      </a:r>
+                      <a:r>
+                        <a:rPr lang="en-US" sz="1200" baseline="0" dirty="0" err="1" smtClean="0">
+                          <a:effectLst/>
+                          <a:latin typeface="Times New Roman" panose="02020603050405020304" pitchFamily="18" charset="0"/>
+                          <a:ea typeface="Times New Roman" panose="02020603050405020304" pitchFamily="18" charset="0"/>
+                        </a:rPr>
+                        <a:t>Rs</a:t>
+                      </a:r>
                       <a:endParaRPr lang="en-US" sz="1200" dirty="0">
                         <a:effectLst/>
                         <a:latin typeface="Times New Roman" panose="02020603050405020304" pitchFamily="18" charset="0"/>
@@ -12462,11 +12610,11 @@
                 </a:tc>
                 <a:extLst>
                   <a:ext uri="{0D108BD9-81ED-4DB2-BD59-A6C34878D82A}">
-                    <a16:rowId xmlns:a16="http://schemas.microsoft.com/office/drawing/2014/main" val="10003"/>
+                    <a16:rowId xmlns:a16="http://schemas.microsoft.com/office/drawing/2014/main" xmlns="" val="10003"/>
                   </a:ext>
                 </a:extLst>
               </a:tr>
-              <a:tr h="224175">
+              <a:tr h="287471">
                 <a:tc>
                   <a:txBody>
                     <a:bodyPr/>
@@ -12517,16 +12665,10 @@
                         </a:spcAft>
                       </a:pPr>
                       <a:r>
-                        <a:rPr lang="en-US" sz="1200" dirty="0" err="1" smtClean="0">
-                          <a:effectLst/>
-                        </a:rPr>
-                        <a:t>Rs</a:t>
-                      </a:r>
-                      <a:r>
                         <a:rPr lang="en-US" sz="1200" baseline="0" dirty="0" smtClean="0">
                           <a:effectLst/>
                         </a:rPr>
-                        <a:t> ..</a:t>
+                        <a:t> 179,238Rs </a:t>
                       </a:r>
                       <a:r>
                         <a:rPr lang="en-US" sz="1200" dirty="0" smtClean="0">
@@ -12545,7 +12687,7 @@
                 </a:tc>
                 <a:extLst>
                   <a:ext uri="{0D108BD9-81ED-4DB2-BD59-A6C34878D82A}">
-                    <a16:rowId xmlns:a16="http://schemas.microsoft.com/office/drawing/2014/main" val="10004"/>
+                    <a16:rowId xmlns:a16="http://schemas.microsoft.com/office/drawing/2014/main" xmlns="" val="10004"/>
                   </a:ext>
                 </a:extLst>
               </a:tr>
@@ -12562,14 +12704,14 @@
           <p:nvPr>
             <p:extLst>
               <p:ext uri="{D42A27DB-BD31-4B8C-83A1-F6EECF244321}">
-                <p14:modId xmlns:p14="http://schemas.microsoft.com/office/powerpoint/2010/main" val="3998521517"/>
+                <p14:modId xmlns:p14="http://schemas.microsoft.com/office/powerpoint/2010/main" val="2138909207"/>
               </p:ext>
             </p:extLst>
           </p:nvPr>
         </p:nvGraphicFramePr>
         <p:xfrm>
           <a:off x="1067118" y="4419600"/>
-          <a:ext cx="6817360" cy="1289210"/>
+          <a:ext cx="6817360" cy="1143001"/>
         </p:xfrm>
         <a:graphic>
           <a:graphicData uri="http://schemas.openxmlformats.org/drawingml/2006/table">
@@ -12581,14 +12723,14 @@
                 <a:gridCol w="3408680">
                   <a:extLst>
                     <a:ext uri="{9D8B030D-6E8A-4147-A177-3AD203B41FA5}">
-                      <a16:colId xmlns:a16="http://schemas.microsoft.com/office/drawing/2014/main" val="20000"/>
+                      <a16:colId xmlns:a16="http://schemas.microsoft.com/office/drawing/2014/main" xmlns="" val="20000"/>
                     </a:ext>
                   </a:extLst>
                 </a:gridCol>
                 <a:gridCol w="3408680">
                   <a:extLst>
                     <a:ext uri="{9D8B030D-6E8A-4147-A177-3AD203B41FA5}">
-                      <a16:colId xmlns:a16="http://schemas.microsoft.com/office/drawing/2014/main" val="20001"/>
+                      <a16:colId xmlns:a16="http://schemas.microsoft.com/office/drawing/2014/main" xmlns="" val="20001"/>
                     </a:ext>
                   </a:extLst>
                 </a:gridCol>
@@ -12652,7 +12794,7 @@
                 </a:tc>
                 <a:extLst>
                   <a:ext uri="{0D108BD9-81ED-4DB2-BD59-A6C34878D82A}">
-                    <a16:rowId xmlns:a16="http://schemas.microsoft.com/office/drawing/2014/main" val="10000"/>
+                    <a16:rowId xmlns:a16="http://schemas.microsoft.com/office/drawing/2014/main" xmlns="" val="10000"/>
                   </a:ext>
                 </a:extLst>
               </a:tr>
@@ -12676,7 +12818,15 @@
                           <a:latin typeface="Times New Roman" panose="02020603050405020304" pitchFamily="18" charset="0"/>
                           <a:ea typeface="Times New Roman" panose="02020603050405020304" pitchFamily="18" charset="0"/>
                         </a:rPr>
-                        <a:t>.</a:t>
+                        <a:t>. Windows / Mac</a:t>
+                      </a:r>
+                      <a:r>
+                        <a:rPr lang="en-US" sz="1200" baseline="0" dirty="0" smtClean="0">
+                          <a:effectLst/>
+                          <a:latin typeface="Times New Roman" panose="02020603050405020304" pitchFamily="18" charset="0"/>
+                          <a:ea typeface="Times New Roman" panose="02020603050405020304" pitchFamily="18" charset="0"/>
+                        </a:rPr>
+                        <a:t> OS </a:t>
                       </a:r>
                       <a:endParaRPr lang="en-US" sz="1200" dirty="0">
                         <a:effectLst/>
@@ -12700,6 +12850,22 @@
                           <a:spcPts val="0"/>
                         </a:spcAft>
                       </a:pPr>
+                      <a:r>
+                        <a:rPr lang="en-US" sz="1200" dirty="0" smtClean="0">
+                          <a:effectLst/>
+                          <a:latin typeface="Times New Roman" panose="02020603050405020304" pitchFamily="18" charset="0"/>
+                          <a:ea typeface="Times New Roman" panose="02020603050405020304" pitchFamily="18" charset="0"/>
+                        </a:rPr>
+                        <a:t>20,000</a:t>
+                      </a:r>
+                      <a:r>
+                        <a:rPr lang="en-US" sz="1200" baseline="0" dirty="0" smtClean="0">
+                          <a:effectLst/>
+                          <a:latin typeface="Times New Roman" panose="02020603050405020304" pitchFamily="18" charset="0"/>
+                          <a:ea typeface="Times New Roman" panose="02020603050405020304" pitchFamily="18" charset="0"/>
+                        </a:rPr>
+                        <a:t>Rs</a:t>
+                      </a:r>
                       <a:endParaRPr lang="en-US" sz="1200" dirty="0">
                         <a:effectLst/>
                         <a:latin typeface="Times New Roman" panose="02020603050405020304" pitchFamily="18" charset="0"/>
@@ -12711,7 +12877,7 @@
                 </a:tc>
                 <a:extLst>
                   <a:ext uri="{0D108BD9-81ED-4DB2-BD59-A6C34878D82A}">
-                    <a16:rowId xmlns:a16="http://schemas.microsoft.com/office/drawing/2014/main" val="10001"/>
+                    <a16:rowId xmlns:a16="http://schemas.microsoft.com/office/drawing/2014/main" xmlns="" val="10001"/>
                   </a:ext>
                 </a:extLst>
               </a:tr>
@@ -12735,7 +12901,7 @@
                           <a:latin typeface="+mn-lt"/>
                           <a:ea typeface="+mn-ea"/>
                         </a:rPr>
-                        <a:t>.</a:t>
+                        <a:t>. Laptop</a:t>
                       </a:r>
                       <a:endParaRPr lang="en-US" sz="1200" dirty="0">
                         <a:effectLst/>
@@ -12759,6 +12925,14 @@
                           <a:spcPts val="0"/>
                         </a:spcAft>
                       </a:pPr>
+                      <a:r>
+                        <a:rPr lang="en-US" sz="1200" dirty="0" smtClean="0">
+                          <a:effectLst/>
+                          <a:latin typeface="Times New Roman" panose="02020603050405020304" pitchFamily="18" charset="0"/>
+                          <a:ea typeface="Times New Roman" panose="02020603050405020304" pitchFamily="18" charset="0"/>
+                        </a:rPr>
+                        <a:t>60,000Rs</a:t>
+                      </a:r>
                       <a:endParaRPr lang="en-US" sz="1200" dirty="0">
                         <a:effectLst/>
                         <a:latin typeface="Times New Roman" panose="02020603050405020304" pitchFamily="18" charset="0"/>
@@ -12770,7 +12944,7 @@
                 </a:tc>
                 <a:extLst>
                   <a:ext uri="{0D108BD9-81ED-4DB2-BD59-A6C34878D82A}">
-                    <a16:rowId xmlns:a16="http://schemas.microsoft.com/office/drawing/2014/main" val="10002"/>
+                    <a16:rowId xmlns:a16="http://schemas.microsoft.com/office/drawing/2014/main" xmlns="" val="10002"/>
                   </a:ext>
                 </a:extLst>
               </a:tr>
@@ -12794,7 +12968,15 @@
                           <a:latin typeface="+mn-lt"/>
                           <a:ea typeface="+mn-ea"/>
                         </a:rPr>
-                        <a:t>.</a:t>
+                        <a:t>. External</a:t>
+                      </a:r>
+                      <a:r>
+                        <a:rPr lang="en-US" sz="1100" baseline="0" dirty="0" smtClean="0">
+                          <a:effectLst/>
+                          <a:latin typeface="+mn-lt"/>
+                          <a:ea typeface="+mn-ea"/>
+                        </a:rPr>
+                        <a:t> Hard Drive</a:t>
                       </a:r>
                       <a:endParaRPr lang="en-US" sz="1200" dirty="0">
                         <a:effectLst/>
@@ -12818,6 +13000,14 @@
                           <a:spcPts val="0"/>
                         </a:spcAft>
                       </a:pPr>
+                      <a:r>
+                        <a:rPr lang="en-US" sz="1200" dirty="0" smtClean="0">
+                          <a:effectLst/>
+                          <a:latin typeface="Times New Roman" panose="02020603050405020304" pitchFamily="18" charset="0"/>
+                          <a:ea typeface="Times New Roman" panose="02020603050405020304" pitchFamily="18" charset="0"/>
+                        </a:rPr>
+                        <a:t>10,000Rs</a:t>
+                      </a:r>
                       <a:endParaRPr lang="en-US" sz="1200" dirty="0">
                         <a:effectLst/>
                         <a:latin typeface="Times New Roman" panose="02020603050405020304" pitchFamily="18" charset="0"/>
@@ -12829,7 +13019,7 @@
                 </a:tc>
                 <a:extLst>
                   <a:ext uri="{0D108BD9-81ED-4DB2-BD59-A6C34878D82A}">
-                    <a16:rowId xmlns:a16="http://schemas.microsoft.com/office/drawing/2014/main" val="10003"/>
+                    <a16:rowId xmlns:a16="http://schemas.microsoft.com/office/drawing/2014/main" xmlns="" val="10003"/>
                   </a:ext>
                 </a:extLst>
               </a:tr>
@@ -12888,16 +13078,16 @@
                         </a:spcAft>
                       </a:pPr>
                       <a:r>
-                        <a:rPr lang="en-US" sz="1200" dirty="0" err="1" smtClean="0">
+                        <a:rPr lang="en-US" sz="1200" baseline="0" dirty="0" smtClean="0">
                           <a:effectLst/>
                         </a:rPr>
-                        <a:t>Rs</a:t>
+                        <a:t> 90,000Rs </a:t>
                       </a:r>
                       <a:r>
                         <a:rPr lang="en-US" sz="1200" baseline="0" dirty="0" smtClean="0">
                           <a:effectLst/>
                         </a:rPr>
-                        <a:t>  .. </a:t>
+                        <a:t>.. </a:t>
                       </a:r>
                       <a:r>
                         <a:rPr lang="en-US" sz="1200" dirty="0" smtClean="0">
@@ -12916,7 +13106,7 @@
                 </a:tc>
                 <a:extLst>
                   <a:ext uri="{0D108BD9-81ED-4DB2-BD59-A6C34878D82A}">
-                    <a16:rowId xmlns:a16="http://schemas.microsoft.com/office/drawing/2014/main" val="10004"/>
+                    <a16:rowId xmlns:a16="http://schemas.microsoft.com/office/drawing/2014/main" xmlns="" val="10004"/>
                   </a:ext>
                 </a:extLst>
               </a:tr>
@@ -13100,6 +13290,16 @@
             <a:endParaRPr lang="en-US" dirty="0" smtClean="0"/>
           </a:p>
           <a:p>
+            <a:r>
+              <a:rPr lang="en-US" dirty="0" smtClean="0"/>
+              <a:t> Total Cost  = 350,000Rs+ 179,238Rs + 90,000Rs</a:t>
+            </a:r>
+          </a:p>
+          <a:p>
+            <a:r>
+              <a:rPr lang="en-US" dirty="0" smtClean="0"/>
+              <a:t> = 619,238Rs/-</a:t>
+            </a:r>
             <a:endParaRPr lang="en-US" dirty="0" smtClean="0"/>
           </a:p>
           <a:p>
@@ -15524,7 +15724,7 @@
         </p:nvGraphicFramePr>
         <p:xfrm>
           <a:off x="228601" y="1626326"/>
-          <a:ext cx="8610600" cy="4562774"/>
+          <a:ext cx="8610600" cy="4522696"/>
         </p:xfrm>
         <a:graphic>
           <a:graphicData uri="http://schemas.openxmlformats.org/drawingml/2006/table">
@@ -15536,14 +15736,14 @@
                 <a:gridCol w="4194906">
                   <a:extLst>
                     <a:ext uri="{9D8B030D-6E8A-4147-A177-3AD203B41FA5}">
-                      <a16:colId xmlns:a16="http://schemas.microsoft.com/office/drawing/2014/main" val="1037918602"/>
+                      <a16:colId xmlns:a16="http://schemas.microsoft.com/office/drawing/2014/main" xmlns="" val="1037918602"/>
                     </a:ext>
                   </a:extLst>
                 </a:gridCol>
                 <a:gridCol w="4415694">
                   <a:extLst>
                     <a:ext uri="{9D8B030D-6E8A-4147-A177-3AD203B41FA5}">
-                      <a16:colId xmlns:a16="http://schemas.microsoft.com/office/drawing/2014/main" val="3917592924"/>
+                      <a16:colId xmlns:a16="http://schemas.microsoft.com/office/drawing/2014/main" xmlns="" val="3917592924"/>
                     </a:ext>
                   </a:extLst>
                 </a:gridCol>
@@ -15619,7 +15819,7 @@
                 </a:tc>
                 <a:extLst>
                   <a:ext uri="{0D108BD9-81ED-4DB2-BD59-A6C34878D82A}">
-                    <a16:rowId xmlns:a16="http://schemas.microsoft.com/office/drawing/2014/main" val="162647498"/>
+                    <a16:rowId xmlns:a16="http://schemas.microsoft.com/office/drawing/2014/main" xmlns="" val="162647498"/>
                   </a:ext>
                 </a:extLst>
               </a:tr>
@@ -15682,7 +15882,7 @@
                 </a:tc>
                 <a:extLst>
                   <a:ext uri="{0D108BD9-81ED-4DB2-BD59-A6C34878D82A}">
-                    <a16:rowId xmlns:a16="http://schemas.microsoft.com/office/drawing/2014/main" val="3300513783"/>
+                    <a16:rowId xmlns:a16="http://schemas.microsoft.com/office/drawing/2014/main" xmlns="" val="3300513783"/>
                   </a:ext>
                 </a:extLst>
               </a:tr>
@@ -15773,7 +15973,7 @@
                 </a:tc>
                 <a:extLst>
                   <a:ext uri="{0D108BD9-81ED-4DB2-BD59-A6C34878D82A}">
-                    <a16:rowId xmlns:a16="http://schemas.microsoft.com/office/drawing/2014/main" val="40743910"/>
+                    <a16:rowId xmlns:a16="http://schemas.microsoft.com/office/drawing/2014/main" xmlns="" val="40743910"/>
                   </a:ext>
                 </a:extLst>
               </a:tr>
@@ -15836,7 +16036,7 @@
                 </a:tc>
                 <a:extLst>
                   <a:ext uri="{0D108BD9-81ED-4DB2-BD59-A6C34878D82A}">
-                    <a16:rowId xmlns:a16="http://schemas.microsoft.com/office/drawing/2014/main" val="2427628382"/>
+                    <a16:rowId xmlns:a16="http://schemas.microsoft.com/office/drawing/2014/main" xmlns="" val="2427628382"/>
                   </a:ext>
                 </a:extLst>
               </a:tr>
@@ -17022,35 +17222,35 @@
                 <a:gridCol w="1630680">
                   <a:extLst>
                     <a:ext uri="{9D8B030D-6E8A-4147-A177-3AD203B41FA5}">
-                      <a16:colId xmlns:a16="http://schemas.microsoft.com/office/drawing/2014/main" val="2817198724"/>
+                      <a16:colId xmlns:a16="http://schemas.microsoft.com/office/drawing/2014/main" xmlns="" val="2817198724"/>
                     </a:ext>
                   </a:extLst>
                 </a:gridCol>
                 <a:gridCol w="1630680">
                   <a:extLst>
                     <a:ext uri="{9D8B030D-6E8A-4147-A177-3AD203B41FA5}">
-                      <a16:colId xmlns:a16="http://schemas.microsoft.com/office/drawing/2014/main" val="3954306868"/>
+                      <a16:colId xmlns:a16="http://schemas.microsoft.com/office/drawing/2014/main" xmlns="" val="3954306868"/>
                     </a:ext>
                   </a:extLst>
                 </a:gridCol>
                 <a:gridCol w="1630680">
                   <a:extLst>
                     <a:ext uri="{9D8B030D-6E8A-4147-A177-3AD203B41FA5}">
-                      <a16:colId xmlns:a16="http://schemas.microsoft.com/office/drawing/2014/main" val="3592228136"/>
+                      <a16:colId xmlns:a16="http://schemas.microsoft.com/office/drawing/2014/main" xmlns="" val="3592228136"/>
                     </a:ext>
                   </a:extLst>
                 </a:gridCol>
                 <a:gridCol w="1630680">
                   <a:extLst>
                     <a:ext uri="{9D8B030D-6E8A-4147-A177-3AD203B41FA5}">
-                      <a16:colId xmlns:a16="http://schemas.microsoft.com/office/drawing/2014/main" val="3138199372"/>
+                      <a16:colId xmlns:a16="http://schemas.microsoft.com/office/drawing/2014/main" xmlns="" val="3138199372"/>
                     </a:ext>
                   </a:extLst>
                 </a:gridCol>
                 <a:gridCol w="1630680">
                   <a:extLst>
                     <a:ext uri="{9D8B030D-6E8A-4147-A177-3AD203B41FA5}">
-                      <a16:colId xmlns:a16="http://schemas.microsoft.com/office/drawing/2014/main" val="611672242"/>
+                      <a16:colId xmlns:a16="http://schemas.microsoft.com/office/drawing/2014/main" xmlns="" val="611672242"/>
                     </a:ext>
                   </a:extLst>
                 </a:gridCol>
@@ -17213,7 +17413,7 @@
                 </a:tc>
                 <a:extLst>
                   <a:ext uri="{0D108BD9-81ED-4DB2-BD59-A6C34878D82A}">
-                    <a16:rowId xmlns:a16="http://schemas.microsoft.com/office/drawing/2014/main" val="1421857550"/>
+                    <a16:rowId xmlns:a16="http://schemas.microsoft.com/office/drawing/2014/main" xmlns="" val="1421857550"/>
                   </a:ext>
                 </a:extLst>
               </a:tr>
@@ -17316,7 +17516,7 @@
                 </a:tc>
                 <a:extLst>
                   <a:ext uri="{0D108BD9-81ED-4DB2-BD59-A6C34878D82A}">
-                    <a16:rowId xmlns:a16="http://schemas.microsoft.com/office/drawing/2014/main" val="189024563"/>
+                    <a16:rowId xmlns:a16="http://schemas.microsoft.com/office/drawing/2014/main" xmlns="" val="189024563"/>
                   </a:ext>
                 </a:extLst>
               </a:tr>
@@ -17464,7 +17664,7 @@
                 </a:tc>
                 <a:extLst>
                   <a:ext uri="{0D108BD9-81ED-4DB2-BD59-A6C34878D82A}">
-                    <a16:rowId xmlns:a16="http://schemas.microsoft.com/office/drawing/2014/main" val="3736943799"/>
+                    <a16:rowId xmlns:a16="http://schemas.microsoft.com/office/drawing/2014/main" xmlns="" val="3736943799"/>
                   </a:ext>
                 </a:extLst>
               </a:tr>

</xml_diff>